<commit_message>
Completed project with read.me, presentation, and index file
</commit_message>
<xml_diff>
--- a/Presentation.pptx
+++ b/Presentation.pptx
@@ -3711,8 +3711,8 @@
         </p:nvSpPr>
         <p:spPr>
           <a:xfrm>
-            <a:off x="1451580" y="2015732"/>
-            <a:ext cx="4966806" cy="3766286"/>
+            <a:off x="537084" y="1939532"/>
+            <a:ext cx="5086476" cy="4503914"/>
           </a:xfrm>
         </p:spPr>
         <p:txBody>
@@ -3721,584 +3721,79 @@
           <a:p>
             <a:r>
               <a:rPr lang="en-US" dirty="0"/>
-              <a:t>A convolutional neural network was identified as the best performing model.</a:t>
-            </a:r>
-          </a:p>
-          <a:p>
+              <a:t>The final model was selected on the following:</a:t>
+            </a:r>
+          </a:p>
+          <a:p>
+            <a:pPr lvl="1"/>
             <a:r>
               <a:rPr lang="en-US" dirty="0"/>
-              <a:t>The final model was selected based on how accurately it identified pneumonia within the lungs.</a:t>
-            </a:r>
-          </a:p>
-        </p:txBody>
-      </p:sp>
-      <p:grpSp>
-        <p:nvGrpSpPr>
-          <p:cNvPr id="10" name="Group 9">
+              <a:t> How accurate it’s predictions were</a:t>
+            </a:r>
+          </a:p>
+          <a:p>
+            <a:pPr lvl="1"/>
+            <a:r>
+              <a:rPr lang="en-US" dirty="0"/>
+              <a:t>How well it identified lungs that have pneumonia. </a:t>
+            </a:r>
+          </a:p>
+          <a:p>
+            <a:pPr marL="228600" lvl="1" indent="0">
+              <a:buNone/>
+            </a:pPr>
+            <a:endParaRPr lang="en-US" dirty="0"/>
+          </a:p>
+          <a:p>
+            <a:r>
+              <a:rPr lang="en-US" dirty="0"/>
+              <a:t>The final model, while lower in accuracy identified the most number of lungs with pneumonia.</a:t>
+            </a:r>
+          </a:p>
+          <a:p>
+            <a:pPr marL="0" indent="0">
+              <a:buNone/>
+            </a:pPr>
+            <a:endParaRPr lang="en-US" dirty="0"/>
+          </a:p>
+          <a:p>
+            <a:r>
+              <a:rPr lang="en-US" dirty="0"/>
+              <a:t>This model would have saved the most amount off lives.</a:t>
+            </a:r>
+          </a:p>
+        </p:txBody>
+      </p:sp>
+      <p:pic>
+        <p:nvPicPr>
+          <p:cNvPr id="5" name="Picture 4">
             <a:extLst>
               <a:ext uri="{FF2B5EF4-FFF2-40B4-BE49-F238E27FC236}">
-                <a16:creationId xmlns:a16="http://schemas.microsoft.com/office/drawing/2014/main" id="{F51301AE-04F0-D6A7-0656-58E1BFF749AD}"/>
+                <a16:creationId xmlns:a16="http://schemas.microsoft.com/office/drawing/2014/main" id="{56163C3D-A8BD-7F02-FC80-87A357CC1E95}"/>
               </a:ext>
             </a:extLst>
           </p:cNvPr>
-          <p:cNvGrpSpPr/>
+          <p:cNvPicPr>
+            <a:picLocks noChangeAspect="1"/>
+          </p:cNvPicPr>
           <p:nvPr/>
-        </p:nvGrpSpPr>
-        <p:grpSpPr>
-          <a:xfrm>
-            <a:off x="7554734" y="1709844"/>
-            <a:ext cx="3683000" cy="3683000"/>
-            <a:chOff x="7264400" y="2311400"/>
-            <a:chExt cx="3683000" cy="3683000"/>
-          </a:xfrm>
-        </p:grpSpPr>
-        <p:sp>
-          <p:nvSpPr>
-            <p:cNvPr id="6" name="Rectangle 5">
-              <a:extLst>
-                <a:ext uri="{FF2B5EF4-FFF2-40B4-BE49-F238E27FC236}">
-                  <a16:creationId xmlns:a16="http://schemas.microsoft.com/office/drawing/2014/main" id="{0640D08B-6E07-D7DE-BBBD-B3EC0177071A}"/>
-                </a:ext>
-              </a:extLst>
-            </p:cNvPr>
-            <p:cNvSpPr/>
-            <p:nvPr/>
-          </p:nvSpPr>
-          <p:spPr>
-            <a:xfrm>
-              <a:off x="7264400" y="2311400"/>
-              <a:ext cx="1841500" cy="1841500"/>
-            </a:xfrm>
-            <a:prstGeom prst="rect">
-              <a:avLst/>
-            </a:prstGeom>
-            <a:solidFill>
-              <a:srgbClr val="FFFF00"/>
-            </a:solidFill>
-          </p:spPr>
-          <p:style>
-            <a:lnRef idx="2">
-              <a:schemeClr val="accent1">
-                <a:shade val="15000"/>
-              </a:schemeClr>
-            </a:lnRef>
-            <a:fillRef idx="1">
-              <a:schemeClr val="accent1"/>
-            </a:fillRef>
-            <a:effectRef idx="0">
-              <a:schemeClr val="accent1"/>
-            </a:effectRef>
-            <a:fontRef idx="minor">
-              <a:schemeClr val="lt1"/>
-            </a:fontRef>
-          </p:style>
-          <p:txBody>
-            <a:bodyPr rtlCol="0" anchor="ctr"/>
-            <a:lstStyle/>
-            <a:p>
-              <a:pPr algn="ctr"/>
-              <a:endParaRPr lang="en-US"/>
-            </a:p>
-          </p:txBody>
-        </p:sp>
-        <p:sp>
-          <p:nvSpPr>
-            <p:cNvPr id="7" name="Rectangle 6">
-              <a:extLst>
-                <a:ext uri="{FF2B5EF4-FFF2-40B4-BE49-F238E27FC236}">
-                  <a16:creationId xmlns:a16="http://schemas.microsoft.com/office/drawing/2014/main" id="{8C00E636-123C-C19C-A718-C33D87ADC535}"/>
-                </a:ext>
-              </a:extLst>
-            </p:cNvPr>
-            <p:cNvSpPr/>
-            <p:nvPr/>
-          </p:nvSpPr>
-          <p:spPr>
-            <a:xfrm>
-              <a:off x="9105900" y="2311400"/>
-              <a:ext cx="1841500" cy="1841500"/>
-            </a:xfrm>
-            <a:prstGeom prst="rect">
-              <a:avLst/>
-            </a:prstGeom>
-            <a:solidFill>
-              <a:srgbClr val="7030A0"/>
-            </a:solidFill>
-          </p:spPr>
-          <p:style>
-            <a:lnRef idx="2">
-              <a:schemeClr val="accent1">
-                <a:shade val="15000"/>
-              </a:schemeClr>
-            </a:lnRef>
-            <a:fillRef idx="1">
-              <a:schemeClr val="accent1"/>
-            </a:fillRef>
-            <a:effectRef idx="0">
-              <a:schemeClr val="accent1"/>
-            </a:effectRef>
-            <a:fontRef idx="minor">
-              <a:schemeClr val="lt1"/>
-            </a:fontRef>
-          </p:style>
-          <p:txBody>
-            <a:bodyPr rtlCol="0" anchor="ctr"/>
-            <a:lstStyle/>
-            <a:p>
-              <a:pPr algn="ctr"/>
-              <a:endParaRPr lang="en-US"/>
-            </a:p>
-          </p:txBody>
-        </p:sp>
-        <p:sp>
-          <p:nvSpPr>
-            <p:cNvPr id="8" name="Rectangle 7">
-              <a:extLst>
-                <a:ext uri="{FF2B5EF4-FFF2-40B4-BE49-F238E27FC236}">
-                  <a16:creationId xmlns:a16="http://schemas.microsoft.com/office/drawing/2014/main" id="{CA5AF06C-100C-63A0-71EF-8BE0910CD022}"/>
-                </a:ext>
-              </a:extLst>
-            </p:cNvPr>
-            <p:cNvSpPr/>
-            <p:nvPr/>
-          </p:nvSpPr>
-          <p:spPr>
-            <a:xfrm>
-              <a:off x="7264400" y="4152900"/>
-              <a:ext cx="1841500" cy="1841500"/>
-            </a:xfrm>
-            <a:prstGeom prst="rect">
-              <a:avLst/>
-            </a:prstGeom>
-            <a:solidFill>
-              <a:srgbClr val="7030A0"/>
-            </a:solidFill>
-          </p:spPr>
-          <p:style>
-            <a:lnRef idx="2">
-              <a:schemeClr val="accent1">
-                <a:shade val="15000"/>
-              </a:schemeClr>
-            </a:lnRef>
-            <a:fillRef idx="1">
-              <a:schemeClr val="accent1"/>
-            </a:fillRef>
-            <a:effectRef idx="0">
-              <a:schemeClr val="accent1"/>
-            </a:effectRef>
-            <a:fontRef idx="minor">
-              <a:schemeClr val="lt1"/>
-            </a:fontRef>
-          </p:style>
-          <p:txBody>
-            <a:bodyPr rtlCol="0" anchor="ctr"/>
-            <a:lstStyle/>
-            <a:p>
-              <a:pPr algn="ctr"/>
-              <a:endParaRPr lang="en-US"/>
-            </a:p>
-          </p:txBody>
-        </p:sp>
-        <p:sp>
-          <p:nvSpPr>
-            <p:cNvPr id="9" name="Rectangle 8">
-              <a:extLst>
-                <a:ext uri="{FF2B5EF4-FFF2-40B4-BE49-F238E27FC236}">
-                  <a16:creationId xmlns:a16="http://schemas.microsoft.com/office/drawing/2014/main" id="{45B53C46-FA98-8FFE-DECE-75F59231335C}"/>
-                </a:ext>
-              </a:extLst>
-            </p:cNvPr>
-            <p:cNvSpPr/>
-            <p:nvPr/>
-          </p:nvSpPr>
-          <p:spPr>
-            <a:xfrm>
-              <a:off x="9105900" y="4152900"/>
-              <a:ext cx="1841500" cy="1841500"/>
-            </a:xfrm>
-            <a:prstGeom prst="rect">
-              <a:avLst/>
-            </a:prstGeom>
-            <a:solidFill>
-              <a:srgbClr val="92D050"/>
-            </a:solidFill>
-          </p:spPr>
-          <p:style>
-            <a:lnRef idx="2">
-              <a:schemeClr val="accent1">
-                <a:shade val="15000"/>
-              </a:schemeClr>
-            </a:lnRef>
-            <a:fillRef idx="1">
-              <a:schemeClr val="accent1"/>
-            </a:fillRef>
-            <a:effectRef idx="0">
-              <a:schemeClr val="accent1"/>
-            </a:effectRef>
-            <a:fontRef idx="minor">
-              <a:schemeClr val="lt1"/>
-            </a:fontRef>
-          </p:style>
-          <p:txBody>
-            <a:bodyPr rtlCol="0" anchor="ctr"/>
-            <a:lstStyle/>
-            <a:p>
-              <a:pPr algn="ctr"/>
-              <a:endParaRPr lang="en-US"/>
-            </a:p>
-          </p:txBody>
-        </p:sp>
-      </p:grpSp>
-      <p:sp>
-        <p:nvSpPr>
-          <p:cNvPr id="11" name="TextBox 10">
-            <a:extLst>
-              <a:ext uri="{FF2B5EF4-FFF2-40B4-BE49-F238E27FC236}">
-                <a16:creationId xmlns:a16="http://schemas.microsoft.com/office/drawing/2014/main" id="{F5897A48-C5E0-35B0-0DBA-4AEB91903EFF}"/>
-              </a:ext>
-            </a:extLst>
-          </p:cNvPr>
-          <p:cNvSpPr txBox="1"/>
-          <p:nvPr/>
-        </p:nvSpPr>
+        </p:nvPicPr>
+        <p:blipFill>
+          <a:blip r:embed="rId2"/>
+          <a:stretch>
+            <a:fillRect/>
+          </a:stretch>
+        </p:blipFill>
         <p:spPr>
           <a:xfrm>
-            <a:off x="6770962" y="2516593"/>
-            <a:ext cx="953468" cy="369332"/>
+            <a:off x="5996211" y="1841130"/>
+            <a:ext cx="5895922" cy="4332094"/>
           </a:xfrm>
           <a:prstGeom prst="rect">
             <a:avLst/>
           </a:prstGeom>
-          <a:noFill/>
         </p:spPr>
-        <p:txBody>
-          <a:bodyPr wrap="square" rtlCol="0">
-            <a:spAutoFit/>
-          </a:bodyPr>
-          <a:lstStyle/>
-          <a:p>
-            <a:r>
-              <a:rPr lang="en-US" dirty="0"/>
-              <a:t>False</a:t>
-            </a:r>
-          </a:p>
-        </p:txBody>
-      </p:sp>
-      <p:sp>
-        <p:nvSpPr>
-          <p:cNvPr id="12" name="TextBox 11">
-            <a:extLst>
-              <a:ext uri="{FF2B5EF4-FFF2-40B4-BE49-F238E27FC236}">
-                <a16:creationId xmlns:a16="http://schemas.microsoft.com/office/drawing/2014/main" id="{7D119C56-6F39-4DC7-F99B-51AC216B620E}"/>
-              </a:ext>
-            </a:extLst>
-          </p:cNvPr>
-          <p:cNvSpPr txBox="1"/>
-          <p:nvPr/>
-        </p:nvSpPr>
-        <p:spPr>
-          <a:xfrm>
-            <a:off x="6829684" y="4398849"/>
-            <a:ext cx="953468" cy="369332"/>
-          </a:xfrm>
-          <a:prstGeom prst="rect">
-            <a:avLst/>
-          </a:prstGeom>
-          <a:noFill/>
-        </p:spPr>
-        <p:txBody>
-          <a:bodyPr wrap="square" rtlCol="0">
-            <a:spAutoFit/>
-          </a:bodyPr>
-          <a:lstStyle/>
-          <a:p>
-            <a:r>
-              <a:rPr lang="en-US" dirty="0"/>
-              <a:t>True</a:t>
-            </a:r>
-          </a:p>
-        </p:txBody>
-      </p:sp>
-      <p:sp>
-        <p:nvSpPr>
-          <p:cNvPr id="13" name="TextBox 12">
-            <a:extLst>
-              <a:ext uri="{FF2B5EF4-FFF2-40B4-BE49-F238E27FC236}">
-                <a16:creationId xmlns:a16="http://schemas.microsoft.com/office/drawing/2014/main" id="{7FA98F6F-DDD2-6CAA-C3DA-D270A95A972B}"/>
-              </a:ext>
-            </a:extLst>
-          </p:cNvPr>
-          <p:cNvSpPr txBox="1"/>
-          <p:nvPr/>
-        </p:nvSpPr>
-        <p:spPr>
-          <a:xfrm>
-            <a:off x="7998750" y="5378261"/>
-            <a:ext cx="953468" cy="369332"/>
-          </a:xfrm>
-          <a:prstGeom prst="rect">
-            <a:avLst/>
-          </a:prstGeom>
-          <a:noFill/>
-        </p:spPr>
-        <p:txBody>
-          <a:bodyPr wrap="square" rtlCol="0">
-            <a:spAutoFit/>
-          </a:bodyPr>
-          <a:lstStyle/>
-          <a:p>
-            <a:r>
-              <a:rPr lang="en-US" dirty="0"/>
-              <a:t>False</a:t>
-            </a:r>
-          </a:p>
-        </p:txBody>
-      </p:sp>
-      <p:sp>
-        <p:nvSpPr>
-          <p:cNvPr id="14" name="TextBox 13">
-            <a:extLst>
-              <a:ext uri="{FF2B5EF4-FFF2-40B4-BE49-F238E27FC236}">
-                <a16:creationId xmlns:a16="http://schemas.microsoft.com/office/drawing/2014/main" id="{AD5CB9FE-C554-B5B0-CC10-7A97F6376A08}"/>
-              </a:ext>
-            </a:extLst>
-          </p:cNvPr>
-          <p:cNvSpPr txBox="1"/>
-          <p:nvPr/>
-        </p:nvSpPr>
-        <p:spPr>
-          <a:xfrm>
-            <a:off x="10106466" y="5412686"/>
-            <a:ext cx="953468" cy="369332"/>
-          </a:xfrm>
-          <a:prstGeom prst="rect">
-            <a:avLst/>
-          </a:prstGeom>
-          <a:noFill/>
-        </p:spPr>
-        <p:txBody>
-          <a:bodyPr wrap="square" rtlCol="0">
-            <a:spAutoFit/>
-          </a:bodyPr>
-          <a:lstStyle/>
-          <a:p>
-            <a:r>
-              <a:rPr lang="en-US" dirty="0"/>
-              <a:t>True</a:t>
-            </a:r>
-          </a:p>
-        </p:txBody>
-      </p:sp>
-      <p:sp>
-        <p:nvSpPr>
-          <p:cNvPr id="15" name="TextBox 14">
-            <a:extLst>
-              <a:ext uri="{FF2B5EF4-FFF2-40B4-BE49-F238E27FC236}">
-                <a16:creationId xmlns:a16="http://schemas.microsoft.com/office/drawing/2014/main" id="{8CCBB490-88E6-62E4-06B2-4470A3A59F35}"/>
-              </a:ext>
-            </a:extLst>
-          </p:cNvPr>
-          <p:cNvSpPr txBox="1"/>
-          <p:nvPr/>
-        </p:nvSpPr>
-        <p:spPr>
-          <a:xfrm>
-            <a:off x="8031468" y="2445052"/>
-            <a:ext cx="953468" cy="369332"/>
-          </a:xfrm>
-          <a:prstGeom prst="rect">
-            <a:avLst/>
-          </a:prstGeom>
-          <a:noFill/>
-        </p:spPr>
-        <p:txBody>
-          <a:bodyPr wrap="square" rtlCol="0">
-            <a:spAutoFit/>
-          </a:bodyPr>
-          <a:lstStyle/>
-          <a:p>
-            <a:r>
-              <a:rPr lang="en-US" dirty="0"/>
-              <a:t>1926</a:t>
-            </a:r>
-          </a:p>
-        </p:txBody>
-      </p:sp>
-      <p:sp>
-        <p:nvSpPr>
-          <p:cNvPr id="16" name="TextBox 15">
-            <a:extLst>
-              <a:ext uri="{FF2B5EF4-FFF2-40B4-BE49-F238E27FC236}">
-                <a16:creationId xmlns:a16="http://schemas.microsoft.com/office/drawing/2014/main" id="{D02655EA-6118-0FAC-548E-830E46E19E81}"/>
-              </a:ext>
-            </a:extLst>
-          </p:cNvPr>
-          <p:cNvSpPr txBox="1"/>
-          <p:nvPr/>
-        </p:nvSpPr>
-        <p:spPr>
-          <a:xfrm>
-            <a:off x="10040232" y="4287428"/>
-            <a:ext cx="953468" cy="369332"/>
-          </a:xfrm>
-          <a:prstGeom prst="rect">
-            <a:avLst/>
-          </a:prstGeom>
-          <a:noFill/>
-        </p:spPr>
-        <p:txBody>
-          <a:bodyPr wrap="square" rtlCol="0">
-            <a:spAutoFit/>
-          </a:bodyPr>
-          <a:lstStyle/>
-          <a:p>
-            <a:r>
-              <a:rPr lang="en-US" dirty="0"/>
-              <a:t>1648</a:t>
-            </a:r>
-          </a:p>
-        </p:txBody>
-      </p:sp>
-      <p:sp>
-        <p:nvSpPr>
-          <p:cNvPr id="17" name="TextBox 16">
-            <a:extLst>
-              <a:ext uri="{FF2B5EF4-FFF2-40B4-BE49-F238E27FC236}">
-                <a16:creationId xmlns:a16="http://schemas.microsoft.com/office/drawing/2014/main" id="{D2CDDA39-2178-DC25-FDD2-EE16C8B60B25}"/>
-              </a:ext>
-            </a:extLst>
-          </p:cNvPr>
-          <p:cNvSpPr txBox="1"/>
-          <p:nvPr/>
-        </p:nvSpPr>
-        <p:spPr>
-          <a:xfrm>
-            <a:off x="8031468" y="4271969"/>
-            <a:ext cx="953468" cy="369332"/>
-          </a:xfrm>
-          <a:prstGeom prst="rect">
-            <a:avLst/>
-          </a:prstGeom>
-          <a:noFill/>
-        </p:spPr>
-        <p:txBody>
-          <a:bodyPr wrap="square" rtlCol="0">
-            <a:spAutoFit/>
-          </a:bodyPr>
-          <a:lstStyle/>
-          <a:p>
-            <a:r>
-              <a:rPr lang="en-US" dirty="0"/>
-              <a:t>612</a:t>
-            </a:r>
-          </a:p>
-        </p:txBody>
-      </p:sp>
-      <p:sp>
-        <p:nvSpPr>
-          <p:cNvPr id="18" name="TextBox 17">
-            <a:extLst>
-              <a:ext uri="{FF2B5EF4-FFF2-40B4-BE49-F238E27FC236}">
-                <a16:creationId xmlns:a16="http://schemas.microsoft.com/office/drawing/2014/main" id="{22130772-C2F1-9644-7E0D-29DB48171534}"/>
-              </a:ext>
-            </a:extLst>
-          </p:cNvPr>
-          <p:cNvSpPr txBox="1"/>
-          <p:nvPr/>
-        </p:nvSpPr>
-        <p:spPr>
-          <a:xfrm>
-            <a:off x="9943192" y="2445052"/>
-            <a:ext cx="953468" cy="369332"/>
-          </a:xfrm>
-          <a:prstGeom prst="rect">
-            <a:avLst/>
-          </a:prstGeom>
-          <a:noFill/>
-        </p:spPr>
-        <p:txBody>
-          <a:bodyPr wrap="square" rtlCol="0">
-            <a:spAutoFit/>
-          </a:bodyPr>
-          <a:lstStyle/>
-          <a:p>
-            <a:r>
-              <a:rPr lang="en-US" dirty="0"/>
-              <a:t>529</a:t>
-            </a:r>
-          </a:p>
-        </p:txBody>
-      </p:sp>
-      <p:sp>
-        <p:nvSpPr>
-          <p:cNvPr id="19" name="TextBox 18">
-            <a:extLst>
-              <a:ext uri="{FF2B5EF4-FFF2-40B4-BE49-F238E27FC236}">
-                <a16:creationId xmlns:a16="http://schemas.microsoft.com/office/drawing/2014/main" id="{2C9FCDF9-0B24-7EA2-2273-714F419FAADF}"/>
-              </a:ext>
-            </a:extLst>
-          </p:cNvPr>
-          <p:cNvSpPr txBox="1"/>
-          <p:nvPr/>
-        </p:nvSpPr>
-        <p:spPr>
-          <a:xfrm rot="16200000">
-            <a:off x="5574730" y="3560449"/>
-            <a:ext cx="1953797" cy="461665"/>
-          </a:xfrm>
-          <a:prstGeom prst="rect">
-            <a:avLst/>
-          </a:prstGeom>
-          <a:noFill/>
-        </p:spPr>
-        <p:txBody>
-          <a:bodyPr wrap="square" rtlCol="0">
-            <a:spAutoFit/>
-          </a:bodyPr>
-          <a:lstStyle/>
-          <a:p>
-            <a:r>
-              <a:rPr lang="en-US" sz="2400" dirty="0"/>
-              <a:t>Actual Value</a:t>
-            </a:r>
-          </a:p>
-        </p:txBody>
-      </p:sp>
-      <p:sp>
-        <p:nvSpPr>
-          <p:cNvPr id="20" name="TextBox 19">
-            <a:extLst>
-              <a:ext uri="{FF2B5EF4-FFF2-40B4-BE49-F238E27FC236}">
-                <a16:creationId xmlns:a16="http://schemas.microsoft.com/office/drawing/2014/main" id="{D7DCEA71-C19F-950C-2384-6FC08BCAC70E}"/>
-              </a:ext>
-            </a:extLst>
-          </p:cNvPr>
-          <p:cNvSpPr txBox="1"/>
-          <p:nvPr/>
-        </p:nvSpPr>
-        <p:spPr>
-          <a:xfrm>
-            <a:off x="8437161" y="5667263"/>
-            <a:ext cx="2318234" cy="461665"/>
-          </a:xfrm>
-          <a:prstGeom prst="rect">
-            <a:avLst/>
-          </a:prstGeom>
-          <a:noFill/>
-        </p:spPr>
-        <p:txBody>
-          <a:bodyPr wrap="square" rtlCol="0">
-            <a:spAutoFit/>
-          </a:bodyPr>
-          <a:lstStyle/>
-          <a:p>
-            <a:r>
-              <a:rPr lang="en-US" sz="2400" dirty="0"/>
-              <a:t>Model Prediction</a:t>
-            </a:r>
-          </a:p>
-        </p:txBody>
-      </p:sp>
+      </p:pic>
     </p:spTree>
     <p:extLst>
       <p:ext uri="{BB962C8B-B14F-4D97-AF65-F5344CB8AC3E}">
@@ -4380,7 +3875,7 @@
           <a:p>
             <a:r>
               <a:rPr lang="en-US" dirty="0"/>
-              <a:t>These results on the small subset off data are promising since a validation accuracy off 95% was achieved.</a:t>
+              <a:t>These results on the small subset off data are promising since a validation accuracy off 94% was achieved.</a:t>
             </a:r>
           </a:p>
           <a:p>
@@ -4642,10 +4137,9 @@
               <a:t>https://github.com/dragunat2016/Pneumonia_Image_Detection</a:t>
             </a:r>
             <a:r>
-              <a:rPr lang="en-US"/>
+              <a:rPr lang="en-US" dirty="0"/>
               <a:t> </a:t>
             </a:r>
-            <a:endParaRPr lang="en-US" dirty="0"/>
           </a:p>
         </p:txBody>
       </p:sp>

</xml_diff>